<commit_message>
Fixed error in slide
</commit_message>
<xml_diff>
--- a/Lectures/SOFT354-07.pptx
+++ b/Lectures/SOFT354-07.pptx
@@ -265,9 +265,9 @@
 </file>
 
 <file path=ppt/charts/chart1.xml><?xml version="1.0" encoding="utf-8"?>
-<c:chartSpace xmlns:c="http://schemas.openxmlformats.org/drawingml/2006/chart" xmlns:a="http://schemas.openxmlformats.org/drawingml/2006/main" xmlns:r="http://schemas.openxmlformats.org/officeDocument/2006/relationships" xmlns:c16r2="http://schemas.microsoft.com/office/drawing/2015/06/chart">
+<c:chartSpace xmlns:c="http://schemas.openxmlformats.org/drawingml/2006/chart" xmlns:a="http://schemas.openxmlformats.org/drawingml/2006/main" xmlns:r="http://schemas.openxmlformats.org/officeDocument/2006/relationships">
   <c:date1904 val="0"/>
-  <c:lang val="en-US"/>
+  <c:lang val="en-GB"/>
   <c:roundedCorners val="0"/>
   <mc:AlternateContent xmlns:mc="http://schemas.openxmlformats.org/markup-compatibility/2006">
     <mc:Choice xmlns:c14="http://schemas.microsoft.com/office/drawing/2007/8/2/chart" Requires="c14">
@@ -374,19 +374,19 @@
                 <c:formatCode>General</c:formatCode>
                 <c:ptCount val="5"/>
                 <c:pt idx="0">
-                  <c:v>1</c:v>
+                  <c:v>1.0</c:v>
                 </c:pt>
                 <c:pt idx="1">
-                  <c:v>2</c:v>
+                  <c:v>2.0</c:v>
                 </c:pt>
                 <c:pt idx="2">
-                  <c:v>4</c:v>
+                  <c:v>4.0</c:v>
                 </c:pt>
                 <c:pt idx="3">
-                  <c:v>8</c:v>
+                  <c:v>8.0</c:v>
                 </c:pt>
                 <c:pt idx="4">
-                  <c:v>16</c:v>
+                  <c:v>16.0</c:v>
                 </c:pt>
               </c:numCache>
             </c:numRef>
@@ -398,7 +398,7 @@
                 <c:formatCode>General</c:formatCode>
                 <c:ptCount val="5"/>
                 <c:pt idx="0">
-                  <c:v>1</c:v>
+                  <c:v>1.0</c:v>
                 </c:pt>
                 <c:pt idx="1">
                   <c:v>1.9</c:v>
@@ -416,7 +416,7 @@
             </c:numRef>
           </c:yVal>
           <c:smooth val="0"/>
-          <c:extLst>
+          <c:extLst xmlns:c16r2="http://schemas.microsoft.com/office/drawing/2015/06/chart">
             <c:ext xmlns:c16="http://schemas.microsoft.com/office/drawing/2014/chart" uri="{C3380CC4-5D6E-409C-BE32-E72D297353CC}">
               <c16:uniqueId val="{00000000-8F07-4C48-95A3-00136C9874F1}"/>
             </c:ext>
@@ -430,15 +430,15 @@
           <c:showPercent val="0"/>
           <c:showBubbleSize val="0"/>
         </c:dLbls>
-        <c:axId val="153173064"/>
-        <c:axId val="214025824"/>
+        <c:axId val="135808384"/>
+        <c:axId val="135811504"/>
       </c:scatterChart>
       <c:valAx>
-        <c:axId val="153173064"/>
+        <c:axId val="135808384"/>
         <c:scaling>
           <c:orientation val="minMax"/>
-          <c:max val="16"/>
-          <c:min val="1"/>
+          <c:max val="16.0"/>
+          <c:min val="1.0"/>
         </c:scaling>
         <c:delete val="0"/>
         <c:axPos val="b"/>
@@ -549,13 +549,13 @@
             <a:endParaRPr lang="en-US"/>
           </a:p>
         </c:txPr>
-        <c:crossAx val="214025824"/>
+        <c:crossAx val="135811504"/>
         <c:crosses val="autoZero"/>
         <c:crossBetween val="midCat"/>
-        <c:majorUnit val="1"/>
+        <c:majorUnit val="1.0"/>
       </c:valAx>
       <c:valAx>
-        <c:axId val="214025824"/>
+        <c:axId val="135811504"/>
         <c:scaling>
           <c:orientation val="minMax"/>
         </c:scaling>
@@ -612,7 +612,7 @@
             <a:endParaRPr lang="en-US"/>
           </a:p>
         </c:txPr>
-        <c:crossAx val="153173064"/>
+        <c:crossAx val="135808384"/>
         <c:crosses val="autoZero"/>
         <c:crossBetween val="midCat"/>
       </c:valAx>
@@ -652,9 +652,9 @@
 </file>
 
 <file path=ppt/charts/chart2.xml><?xml version="1.0" encoding="utf-8"?>
-<c:chartSpace xmlns:c="http://schemas.openxmlformats.org/drawingml/2006/chart" xmlns:a="http://schemas.openxmlformats.org/drawingml/2006/main" xmlns:r="http://schemas.openxmlformats.org/officeDocument/2006/relationships" xmlns:c16r2="http://schemas.microsoft.com/office/drawing/2015/06/chart">
+<c:chartSpace xmlns:c="http://schemas.openxmlformats.org/drawingml/2006/chart" xmlns:a="http://schemas.openxmlformats.org/drawingml/2006/main" xmlns:r="http://schemas.openxmlformats.org/officeDocument/2006/relationships">
   <c:date1904 val="0"/>
-  <c:lang val="en-US"/>
+  <c:lang val="en-GB"/>
   <c:roundedCorners val="0"/>
   <mc:AlternateContent xmlns:mc="http://schemas.openxmlformats.org/markup-compatibility/2006">
     <mc:Choice xmlns:c14="http://schemas.microsoft.com/office/drawing/2007/8/2/chart" Requires="c14">
@@ -761,19 +761,19 @@
                 <c:formatCode>General</c:formatCode>
                 <c:ptCount val="5"/>
                 <c:pt idx="0">
-                  <c:v>1</c:v>
+                  <c:v>1.0</c:v>
                 </c:pt>
                 <c:pt idx="1">
-                  <c:v>2</c:v>
+                  <c:v>2.0</c:v>
                 </c:pt>
                 <c:pt idx="2">
-                  <c:v>4</c:v>
+                  <c:v>4.0</c:v>
                 </c:pt>
                 <c:pt idx="3">
-                  <c:v>8</c:v>
+                  <c:v>8.0</c:v>
                 </c:pt>
                 <c:pt idx="4">
-                  <c:v>16</c:v>
+                  <c:v>16.0</c:v>
                 </c:pt>
               </c:numCache>
             </c:numRef>
@@ -785,7 +785,7 @@
                 <c:formatCode>General</c:formatCode>
                 <c:ptCount val="5"/>
                 <c:pt idx="0">
-                  <c:v>1</c:v>
+                  <c:v>1.0</c:v>
                 </c:pt>
                 <c:pt idx="1">
                   <c:v>0.95</c:v>
@@ -797,13 +797,13 @@
                   <c:v>0.8125</c:v>
                 </c:pt>
                 <c:pt idx="4">
-                  <c:v>0.67500000000000004</c:v>
+                  <c:v>0.675</c:v>
                 </c:pt>
               </c:numCache>
             </c:numRef>
           </c:yVal>
           <c:smooth val="0"/>
-          <c:extLst>
+          <c:extLst xmlns:c16r2="http://schemas.microsoft.com/office/drawing/2015/06/chart">
             <c:ext xmlns:c16="http://schemas.microsoft.com/office/drawing/2014/chart" uri="{C3380CC4-5D6E-409C-BE32-E72D297353CC}">
               <c16:uniqueId val="{00000000-B7AD-42CB-A913-9FDD3AF5606A}"/>
             </c:ext>
@@ -817,15 +817,15 @@
           <c:showPercent val="0"/>
           <c:showBubbleSize val="0"/>
         </c:dLbls>
-        <c:axId val="343441264"/>
-        <c:axId val="343441592"/>
+        <c:axId val="134627216"/>
+        <c:axId val="134629648"/>
       </c:scatterChart>
       <c:valAx>
-        <c:axId val="343441264"/>
+        <c:axId val="134627216"/>
         <c:scaling>
           <c:orientation val="minMax"/>
-          <c:max val="16"/>
-          <c:min val="1"/>
+          <c:max val="16.0"/>
+          <c:min val="1.0"/>
         </c:scaling>
         <c:delete val="0"/>
         <c:axPos val="b"/>
@@ -936,16 +936,16 @@
             <a:endParaRPr lang="en-US"/>
           </a:p>
         </c:txPr>
-        <c:crossAx val="343441592"/>
+        <c:crossAx val="134629648"/>
         <c:crosses val="autoZero"/>
         <c:crossBetween val="midCat"/>
-        <c:majorUnit val="1"/>
+        <c:majorUnit val="1.0"/>
       </c:valAx>
       <c:valAx>
-        <c:axId val="343441592"/>
+        <c:axId val="134629648"/>
         <c:scaling>
           <c:orientation val="minMax"/>
-          <c:max val="1"/>
+          <c:max val="1.0"/>
           <c:min val="0.5"/>
         </c:scaling>
         <c:delete val="0"/>
@@ -1001,7 +1001,7 @@
             <a:endParaRPr lang="en-US"/>
           </a:p>
         </c:txPr>
-        <c:crossAx val="343441264"/>
+        <c:crossAx val="134627216"/>
         <c:crosses val="autoZero"/>
         <c:crossBetween val="midCat"/>
       </c:valAx>
@@ -10367,8 +10367,8 @@
           </a:p>
         </p:txBody>
       </p:sp>
-      <mc:AlternateContent xmlns:mc="http://schemas.openxmlformats.org/markup-compatibility/2006">
-        <mc:Choice xmlns:a14="http://schemas.microsoft.com/office/drawing/2010/main" Requires="a14">
+      <mc:AlternateContent xmlns:mc="http://schemas.openxmlformats.org/markup-compatibility/2006" xmlns:a14="http://schemas.microsoft.com/office/drawing/2010/main">
+        <mc:Choice Requires="a14">
           <p:sp>
             <p:nvSpPr>
               <p:cNvPr id="3" name="Content Placeholder 2"/>
@@ -10483,7 +10483,7 @@
                         <m:fPr>
                           <m:ctrlPr>
                             <a:rPr lang="en-GB" b="0" i="1" smtClean="0">
-                              <a:latin typeface="Cambria Math" panose="02040503050406030204" pitchFamily="18" charset="0"/>
+                              <a:latin typeface="Cambria Math" charset="0"/>
                             </a:rPr>
                           </m:ctrlPr>
                         </m:fPr>
@@ -10520,7 +10520,7 @@
                         <m:fPr>
                           <m:ctrlPr>
                             <a:rPr lang="en-GB" b="0" i="1" smtClean="0">
-                              <a:latin typeface="Cambria Math" panose="02040503050406030204" pitchFamily="18" charset="0"/>
+                              <a:latin typeface="Cambria Math" charset="0"/>
                             </a:rPr>
                           </m:ctrlPr>
                         </m:fPr>
@@ -10588,7 +10588,7 @@
             </p:txBody>
           </p:sp>
         </mc:Choice>
-        <mc:Fallback>
+        <mc:Fallback xmlns="">
           <p:sp>
             <p:nvSpPr>
               <p:cNvPr id="3" name="Content Placeholder 2"/>
@@ -11005,8 +11005,8 @@
           </a:p>
         </p:txBody>
       </p:sp>
-      <mc:AlternateContent xmlns:mc="http://schemas.openxmlformats.org/markup-compatibility/2006">
-        <mc:Choice xmlns:a14="http://schemas.microsoft.com/office/drawing/2010/main" Requires="a14">
+      <mc:AlternateContent xmlns:mc="http://schemas.openxmlformats.org/markup-compatibility/2006" xmlns:a14="http://schemas.microsoft.com/office/drawing/2010/main">
+        <mc:Choice Requires="a14">
           <p:sp>
             <p:nvSpPr>
               <p:cNvPr id="5" name="Rectangle 4"/>
@@ -11031,6 +11031,7 @@
               </a:bodyPr>
               <a:lstStyle/>
               <a:p>
+                <a:pPr/>
                 <a14:m>
                   <m:oMathPara xmlns:m="http://schemas.openxmlformats.org/officeDocument/2006/math">
                     <m:oMathParaPr>
@@ -11053,7 +11054,7 @@
                         <m:fPr>
                           <m:ctrlPr>
                             <a:rPr lang="en-GB" i="1">
-                              <a:latin typeface="Cambria Math" panose="02040503050406030204" pitchFamily="18" charset="0"/>
+                              <a:latin typeface="Cambria Math" charset="0"/>
                             </a:rPr>
                           </m:ctrlPr>
                         </m:fPr>
@@ -11090,7 +11091,7 @@
                         <m:fPr>
                           <m:ctrlPr>
                             <a:rPr lang="en-GB" i="1">
-                              <a:latin typeface="Cambria Math" panose="02040503050406030204" pitchFamily="18" charset="0"/>
+                              <a:latin typeface="Cambria Math" charset="0"/>
                             </a:rPr>
                           </m:ctrlPr>
                         </m:fPr>
@@ -11119,7 +11120,7 @@
             </p:txBody>
           </p:sp>
         </mc:Choice>
-        <mc:Fallback>
+        <mc:Fallback xmlns="">
           <p:sp>
             <p:nvSpPr>
               <p:cNvPr id="5" name="Rectangle 4"/>
@@ -12736,7 +12737,7 @@
                       <m:sSubPr>
                         <m:ctrlPr>
                           <a:rPr lang="en-GB" b="0" i="1" smtClean="0">
-                            <a:latin typeface="Cambria Math" panose="02040503050406030204" pitchFamily="18" charset="0"/>
+                            <a:latin typeface="Cambria Math" charset="0"/>
                           </a:rPr>
                         </m:ctrlPr>
                       </m:sSubPr>
@@ -12775,7 +12776,7 @@
                       <m:fPr>
                         <m:ctrlPr>
                           <a:rPr lang="en-GB" b="0" i="1" smtClean="0">
-                            <a:latin typeface="Cambria Math" panose="02040503050406030204" pitchFamily="18" charset="0"/>
+                            <a:latin typeface="Cambria Math" charset="0"/>
                           </a:rPr>
                         </m:ctrlPr>
                       </m:fPr>
@@ -12806,7 +12807,7 @@
                       <m:sSubPr>
                         <m:ctrlPr>
                           <a:rPr lang="en-GB" b="0" i="1" smtClean="0">
-                            <a:latin typeface="Cambria Math" panose="02040503050406030204" pitchFamily="18" charset="0"/>
+                            <a:latin typeface="Cambria Math" charset="0"/>
                           </a:rPr>
                         </m:ctrlPr>
                       </m:sSubPr>
@@ -12852,7 +12853,7 @@
                       <m:sSubPr>
                         <m:ctrlPr>
                           <a:rPr lang="en-GB" b="0" i="1" smtClean="0">
-                            <a:latin typeface="Cambria Math" panose="02040503050406030204" pitchFamily="18" charset="0"/>
+                            <a:latin typeface="Cambria Math" charset="0"/>
                           </a:rPr>
                         </m:ctrlPr>
                       </m:sSubPr>
@@ -12889,7 +12890,7 @@
                       <m:sSubPr>
                         <m:ctrlPr>
                           <a:rPr lang="en-GB" b="0" i="1" smtClean="0">
-                            <a:latin typeface="Cambria Math" panose="02040503050406030204" pitchFamily="18" charset="0"/>
+                            <a:latin typeface="Cambria Math" charset="0"/>
                           </a:rPr>
                         </m:ctrlPr>
                       </m:sSubPr>
@@ -12920,7 +12921,7 @@
                       <m:fPr>
                         <m:ctrlPr>
                           <a:rPr lang="en-GB" b="0" i="1" smtClean="0">
-                            <a:latin typeface="Cambria Math" panose="02040503050406030204" pitchFamily="18" charset="0"/>
+                            <a:latin typeface="Cambria Math" charset="0"/>
                           </a:rPr>
                         </m:ctrlPr>
                       </m:fPr>
@@ -12951,7 +12952,7 @@
                       <m:sSubPr>
                         <m:ctrlPr>
                           <a:rPr lang="en-GB" b="0" i="1" smtClean="0">
-                            <a:latin typeface="Cambria Math" panose="02040503050406030204" pitchFamily="18" charset="0"/>
+                            <a:latin typeface="Cambria Math" charset="0"/>
                           </a:rPr>
                         </m:ctrlPr>
                       </m:sSubPr>
@@ -13374,7 +13375,7 @@
                       <m:sSubPr>
                         <m:ctrlPr>
                           <a:rPr lang="en-GB" i="1">
-                            <a:latin typeface="Cambria Math" panose="02040503050406030204" pitchFamily="18" charset="0"/>
+                            <a:latin typeface="Cambria Math" charset="0"/>
                           </a:rPr>
                         </m:ctrlPr>
                       </m:sSubPr>
@@ -13411,7 +13412,7 @@
                       <m:sSubPr>
                         <m:ctrlPr>
                           <a:rPr lang="en-GB" i="1">
-                            <a:latin typeface="Cambria Math" panose="02040503050406030204" pitchFamily="18" charset="0"/>
+                            <a:latin typeface="Cambria Math" charset="0"/>
                           </a:rPr>
                         </m:ctrlPr>
                       </m:sSubPr>
@@ -13442,7 +13443,7 @@
                       <m:fPr>
                         <m:ctrlPr>
                           <a:rPr lang="en-GB" i="1">
-                            <a:latin typeface="Cambria Math" panose="02040503050406030204" pitchFamily="18" charset="0"/>
+                            <a:latin typeface="Cambria Math" charset="0"/>
                           </a:rPr>
                         </m:ctrlPr>
                       </m:fPr>
@@ -13473,7 +13474,7 @@
                       <m:sSubPr>
                         <m:ctrlPr>
                           <a:rPr lang="en-GB" i="1">
-                            <a:latin typeface="Cambria Math" panose="02040503050406030204" pitchFamily="18" charset="0"/>
+                            <a:latin typeface="Cambria Math" charset="0"/>
                           </a:rPr>
                         </m:ctrlPr>
                       </m:sSubPr>
@@ -13517,7 +13518,7 @@
                       <m:fPr>
                         <m:ctrlPr>
                           <a:rPr lang="en-GB" i="1">
-                            <a:latin typeface="Cambria Math" panose="02040503050406030204" pitchFamily="18" charset="0"/>
+                            <a:latin typeface="Cambria Math" charset="0"/>
                           </a:rPr>
                         </m:ctrlPr>
                       </m:fPr>
@@ -13526,7 +13527,7 @@
                           <m:sSubPr>
                             <m:ctrlPr>
                               <a:rPr lang="en-GB" i="1">
-                                <a:latin typeface="Cambria Math" panose="02040503050406030204" pitchFamily="18" charset="0"/>
+                                <a:latin typeface="Cambria Math" charset="0"/>
                               </a:rPr>
                             </m:ctrlPr>
                           </m:sSubPr>
@@ -13553,7 +13554,7 @@
                           <m:sSubPr>
                             <m:ctrlPr>
                               <a:rPr lang="en-GB" i="1">
-                                <a:latin typeface="Cambria Math" panose="02040503050406030204" pitchFamily="18" charset="0"/>
+                                <a:latin typeface="Cambria Math" charset="0"/>
                               </a:rPr>
                             </m:ctrlPr>
                           </m:sSubPr>
@@ -13777,7 +13778,7 @@
                       <m:fPr>
                         <m:ctrlPr>
                           <a:rPr lang="en-GB" b="0" i="1" smtClean="0">
-                            <a:latin typeface="Cambria Math" panose="02040503050406030204" pitchFamily="18" charset="0"/>
+                            <a:latin typeface="Cambria Math" charset="0"/>
                           </a:rPr>
                         </m:ctrlPr>
                       </m:fPr>
@@ -13806,7 +13807,7 @@
                           <m:fPr>
                             <m:ctrlPr>
                               <a:rPr lang="en-GB" b="0" i="1" smtClean="0">
-                                <a:latin typeface="Cambria Math" panose="02040503050406030204" pitchFamily="18" charset="0"/>
+                                <a:latin typeface="Cambria Math" charset="0"/>
                               </a:rPr>
                             </m:ctrlPr>
                           </m:fPr>
@@ -13846,7 +13847,7 @@
                       <m:funcPr>
                         <m:ctrlPr>
                           <a:rPr lang="en-GB" i="1" smtClean="0">
-                            <a:latin typeface="Cambria Math" panose="02040503050406030204" pitchFamily="18" charset="0"/>
+                            <a:latin typeface="Cambria Math" charset="0"/>
                           </a:rPr>
                         </m:ctrlPr>
                       </m:funcPr>
@@ -13855,7 +13856,7 @@
                           <m:limLowPr>
                             <m:ctrlPr>
                               <a:rPr lang="en-GB" i="1" smtClean="0">
-                                <a:latin typeface="Cambria Math" panose="02040503050406030204" pitchFamily="18" charset="0"/>
+                                <a:latin typeface="Cambria Math" charset="0"/>
                               </a:rPr>
                             </m:ctrlPr>
                           </m:limLowPr>
@@ -13906,7 +13907,7 @@
                       <m:fPr>
                         <m:ctrlPr>
                           <a:rPr lang="en-GB" b="0" i="1" smtClean="0">
-                            <a:latin typeface="Cambria Math" panose="02040503050406030204" pitchFamily="18" charset="0"/>
+                            <a:latin typeface="Cambria Math" charset="0"/>
                           </a:rPr>
                         </m:ctrlPr>
                       </m:fPr>
@@ -13966,7 +13967,7 @@
                       <m:fPr>
                         <m:ctrlPr>
                           <a:rPr lang="en-GB" b="0" i="1" smtClean="0">
-                            <a:latin typeface="Cambria Math" panose="02040503050406030204" pitchFamily="18" charset="0"/>
+                            <a:latin typeface="Cambria Math" charset="0"/>
                           </a:rPr>
                         </m:ctrlPr>
                       </m:fPr>
@@ -14049,7 +14050,7 @@
                           <m:sSupPr>
                             <m:ctrlPr>
                               <a:rPr lang="en-GB" b="0" i="1" smtClean="0">
-                                <a:latin typeface="Cambria Math" panose="02040503050406030204" pitchFamily="18" charset="0"/>
+                                <a:latin typeface="Cambria Math" charset="0"/>
                               </a:rPr>
                             </m:ctrlPr>
                           </m:sSupPr>
@@ -14654,7 +14655,7 @@
                       <m:funcPr>
                         <m:ctrlPr>
                           <a:rPr lang="en-GB" i="1">
-                            <a:latin typeface="Cambria Math" panose="02040503050406030204" pitchFamily="18" charset="0"/>
+                            <a:latin typeface="Cambria Math" charset="0"/>
                           </a:rPr>
                         </m:ctrlPr>
                       </m:funcPr>
@@ -14663,7 +14664,7 @@
                           <m:limLowPr>
                             <m:ctrlPr>
                               <a:rPr lang="en-GB" i="1">
-                                <a:latin typeface="Cambria Math" panose="02040503050406030204" pitchFamily="18" charset="0"/>
+                                <a:latin typeface="Cambria Math" charset="0"/>
                               </a:rPr>
                             </m:ctrlPr>
                           </m:limLowPr>
@@ -14714,7 +14715,7 @@
                       <m:fPr>
                         <m:ctrlPr>
                           <a:rPr lang="en-GB" i="1">
-                            <a:latin typeface="Cambria Math" panose="02040503050406030204" pitchFamily="18" charset="0"/>
+                            <a:latin typeface="Cambria Math" charset="0"/>
                           </a:rPr>
                         </m:ctrlPr>
                       </m:fPr>
@@ -16008,7 +16009,7 @@
                         <m:sSubPr>
                           <m:ctrlPr>
                             <a:rPr lang="en-GB" b="0" i="1" smtClean="0">
-                              <a:latin typeface="Cambria Math" panose="02040503050406030204" pitchFamily="18" charset="0"/>
+                              <a:latin typeface="Cambria Math" charset="0"/>
                             </a:rPr>
                           </m:ctrlPr>
                         </m:sSubPr>
@@ -16788,7 +16789,7 @@
                       <m:sSubPr>
                         <m:ctrlPr>
                           <a:rPr lang="en-GB" b="0" i="1" smtClean="0">
-                            <a:latin typeface="Cambria Math" panose="02040503050406030204" pitchFamily="18" charset="0"/>
+                            <a:latin typeface="Cambria Math" charset="0"/>
                           </a:rPr>
                         </m:ctrlPr>
                       </m:sSubPr>
@@ -16900,7 +16901,7 @@
                         <m:sSubPr>
                           <m:ctrlPr>
                             <a:rPr lang="en-GB" sz="2800" i="1">
-                              <a:latin typeface="Cambria Math" panose="02040503050406030204" pitchFamily="18" charset="0"/>
+                              <a:latin typeface="Cambria Math" charset="0"/>
                             </a:rPr>
                           </m:ctrlPr>
                         </m:sSubPr>
@@ -17405,7 +17406,7 @@
                       <m:sSubPr>
                         <m:ctrlPr>
                           <a:rPr lang="en-GB" i="1" smtClean="0">
-                            <a:latin typeface="Cambria Math" panose="02040503050406030204" pitchFamily="18" charset="0"/>
+                            <a:latin typeface="Cambria Math" charset="0"/>
                           </a:rPr>
                         </m:ctrlPr>
                       </m:sSubPr>
@@ -17477,7 +17478,7 @@
                       <m:sSubPr>
                         <m:ctrlPr>
                           <a:rPr lang="en-GB" b="0" i="1" smtClean="0">
-                            <a:latin typeface="Cambria Math" panose="02040503050406030204" pitchFamily="18" charset="0"/>
+                            <a:latin typeface="Cambria Math" charset="0"/>
                           </a:rPr>
                         </m:ctrlPr>
                       </m:sSubPr>
@@ -17527,7 +17528,7 @@
                       <m:sSubPr>
                         <m:ctrlPr>
                           <a:rPr lang="en-GB" b="0" i="1" smtClean="0">
-                            <a:latin typeface="Cambria Math" panose="02040503050406030204" pitchFamily="18" charset="0"/>
+                            <a:latin typeface="Cambria Math" charset="0"/>
                           </a:rPr>
                         </m:ctrlPr>
                       </m:sSubPr>
@@ -17886,7 +17887,7 @@
                       <m:sSubPr>
                         <m:ctrlPr>
                           <a:rPr lang="en-GB" sz="2400" i="1">
-                            <a:latin typeface="Cambria Math" panose="02040503050406030204" pitchFamily="18" charset="0"/>
+                            <a:latin typeface="Cambria Math" charset="0"/>
                           </a:rPr>
                         </m:ctrlPr>
                       </m:sSubPr>
@@ -17952,7 +17953,7 @@
                       <m:sSubPr>
                         <m:ctrlPr>
                           <a:rPr lang="en-GB" b="0" i="1" smtClean="0">
-                            <a:latin typeface="Cambria Math" panose="02040503050406030204" pitchFamily="18" charset="0"/>
+                            <a:latin typeface="Cambria Math" charset="0"/>
                           </a:rPr>
                         </m:ctrlPr>
                       </m:sSubPr>
@@ -18370,7 +18371,7 @@
                       <m:fPr>
                         <m:ctrlPr>
                           <a:rPr lang="en-GB" b="0" i="1" smtClean="0">
-                            <a:latin typeface="Cambria Math" panose="02040503050406030204" pitchFamily="18" charset="0"/>
+                            <a:latin typeface="Cambria Math" charset="0"/>
                           </a:rPr>
                         </m:ctrlPr>
                       </m:fPr>
@@ -18442,7 +18443,7 @@
                       <m:fPr>
                         <m:ctrlPr>
                           <a:rPr lang="en-GB" b="0" i="1" smtClean="0">
-                            <a:latin typeface="Cambria Math" panose="02040503050406030204" pitchFamily="18" charset="0"/>
+                            <a:latin typeface="Cambria Math" charset="0"/>
                           </a:rPr>
                         </m:ctrlPr>
                       </m:fPr>
@@ -18622,8 +18623,8 @@
           </a:p>
         </p:txBody>
       </p:sp>
-      <mc:AlternateContent xmlns:mc="http://schemas.openxmlformats.org/markup-compatibility/2006" xmlns:a14="http://schemas.microsoft.com/office/drawing/2010/main">
-        <mc:Choice Requires="a14">
+      <mc:AlternateContent xmlns:mc="http://schemas.openxmlformats.org/markup-compatibility/2006">
+        <mc:Choice xmlns:a14="http://schemas.microsoft.com/office/drawing/2010/main" Requires="a14">
           <p:sp>
             <p:nvSpPr>
               <p:cNvPr id="3" name="Content Placeholder 2"/>
@@ -18721,15 +18722,19 @@
                   <m:oMath xmlns:m="http://schemas.openxmlformats.org/officeDocument/2006/math">
                     <m:r>
                       <a:rPr lang="en-GB" b="0" i="1" smtClean="0">
-                        <a:latin typeface="Cambria Math" panose="02040503050406030204" pitchFamily="18" charset="0"/>
+                        <a:latin typeface="Cambria Math" charset="0"/>
                       </a:rPr>
-                      <m:t>𝛼</m:t>
+                      <m:t>𝑟</m:t>
                     </m:r>
                   </m:oMath>
                 </a14:m>
                 <a:r>
+                  <a:rPr lang="en-GB" dirty="0" smtClean="0"/>
+                  <a:t> </a:t>
+                </a:r>
+                <a:r>
                   <a:rPr lang="en-GB" dirty="0"/>
-                  <a:t> is the proportion of the running time that’s taken up by serial code, i.e. </a:t>
+                  <a:t>is the proportion of the running time that’s taken up by serial code, i.e. </a:t>
                 </a:r>
                 <a14:m>
                   <m:oMath xmlns:m="http://schemas.openxmlformats.org/officeDocument/2006/math">
@@ -18749,7 +18754,7 @@
                       <m:fPr>
                         <m:ctrlPr>
                           <a:rPr lang="en-GB" b="0" i="1" smtClean="0">
-                            <a:latin typeface="Cambria Math" panose="02040503050406030204" pitchFamily="18" charset="0"/>
+                            <a:latin typeface="Cambria Math" charset="0"/>
                           </a:rPr>
                         </m:ctrlPr>
                       </m:fPr>
@@ -18797,16 +18802,20 @@
                 <a14:m>
                   <m:oMath xmlns:m="http://schemas.openxmlformats.org/officeDocument/2006/math">
                     <m:r>
-                      <a:rPr lang="en-GB" i="1">
-                        <a:latin typeface="Cambria Math" panose="02040503050406030204" pitchFamily="18" charset="0"/>
+                      <a:rPr lang="en-GB" b="0" i="1" smtClean="0">
+                        <a:latin typeface="Cambria Math" charset="0"/>
                       </a:rPr>
-                      <m:t>𝛼</m:t>
+                      <m:t>𝑟</m:t>
                     </m:r>
                   </m:oMath>
                 </a14:m>
                 <a:r>
+                  <a:rPr lang="en-GB" dirty="0" smtClean="0"/>
+                  <a:t> </a:t>
+                </a:r>
+                <a:r>
                   <a:rPr lang="en-GB" dirty="0"/>
-                  <a:t> is small then as p increases, </a:t>
+                  <a:t>is small then as p increases, </a:t>
                 </a:r>
                 <a:r>
                   <a:rPr lang="en-GB" dirty="0" err="1"/>
@@ -18851,7 +18860,7 @@
             </p:txBody>
           </p:sp>
         </mc:Choice>
-        <mc:Fallback xmlns="">
+        <mc:Fallback>
           <p:sp>
             <p:nvSpPr>
               <p:cNvPr id="3" name="Content Placeholder 2"/>
@@ -18863,7 +18872,7 @@
               </p:nvPr>
             </p:nvSpPr>
             <p:spPr>
-              <a:blipFill>
+              <a:blipFill rotWithShape="0">
                 <a:blip r:embed="rId2"/>
                 <a:stretch>
                   <a:fillRect l="-920" r="-1609"/>
@@ -18875,7 +18884,7 @@
               <a:lstStyle/>
               <a:p>
                 <a:r>
-                  <a:rPr lang="en-GB">
+                  <a:rPr lang="en-US">
                     <a:noFill/>
                   </a:rPr>
                   <a:t> </a:t>
@@ -18898,128 +18907,7 @@
   <p:timing>
     <p:tnLst>
       <p:par>
-        <p:cTn id="1" dur="indefinite" restart="never" nodeType="tmRoot">
-          <p:childTnLst>
-            <p:seq concurrent="1" nextAc="seek">
-              <p:cTn id="2" dur="indefinite" nodeType="mainSeq">
-                <p:childTnLst>
-                  <p:par>
-                    <p:cTn id="3" fill="hold">
-                      <p:stCondLst>
-                        <p:cond delay="indefinite"/>
-                      </p:stCondLst>
-                      <p:childTnLst>
-                        <p:par>
-                          <p:cTn id="4" fill="hold">
-                            <p:stCondLst>
-                              <p:cond delay="0"/>
-                            </p:stCondLst>
-                            <p:childTnLst>
-                              <p:par>
-                                <p:cTn id="5" presetID="1" presetClass="entr" presetSubtype="0" fill="hold" nodeType="clickEffect">
-                                  <p:stCondLst>
-                                    <p:cond delay="0"/>
-                                  </p:stCondLst>
-                                  <p:childTnLst>
-                                    <p:set>
-                                      <p:cBhvr>
-                                        <p:cTn id="6" dur="1" fill="hold">
-                                          <p:stCondLst>
-                                            <p:cond delay="0"/>
-                                          </p:stCondLst>
-                                        </p:cTn>
-                                        <p:tgtEl>
-                                          <p:spTgt spid="3">
-                                            <p:txEl>
-                                              <p:pRg st="3" end="3"/>
-                                            </p:txEl>
-                                          </p:spTgt>
-                                        </p:tgtEl>
-                                        <p:attrNameLst>
-                                          <p:attrName>style.visibility</p:attrName>
-                                        </p:attrNameLst>
-                                      </p:cBhvr>
-                                      <p:to>
-                                        <p:strVal val="visible"/>
-                                      </p:to>
-                                    </p:set>
-                                  </p:childTnLst>
-                                </p:cTn>
-                              </p:par>
-                            </p:childTnLst>
-                          </p:cTn>
-                        </p:par>
-                      </p:childTnLst>
-                    </p:cTn>
-                  </p:par>
-                  <p:par>
-                    <p:cTn id="7" fill="hold">
-                      <p:stCondLst>
-                        <p:cond delay="indefinite"/>
-                      </p:stCondLst>
-                      <p:childTnLst>
-                        <p:par>
-                          <p:cTn id="8" fill="hold">
-                            <p:stCondLst>
-                              <p:cond delay="0"/>
-                            </p:stCondLst>
-                            <p:childTnLst>
-                              <p:par>
-                                <p:cTn id="9" presetID="1" presetClass="entr" presetSubtype="0" fill="hold" nodeType="clickEffect">
-                                  <p:stCondLst>
-                                    <p:cond delay="0"/>
-                                  </p:stCondLst>
-                                  <p:childTnLst>
-                                    <p:set>
-                                      <p:cBhvr>
-                                        <p:cTn id="10" dur="1" fill="hold">
-                                          <p:stCondLst>
-                                            <p:cond delay="0"/>
-                                          </p:stCondLst>
-                                        </p:cTn>
-                                        <p:tgtEl>
-                                          <p:spTgt spid="3">
-                                            <p:txEl>
-                                              <p:pRg st="5" end="5"/>
-                                            </p:txEl>
-                                          </p:spTgt>
-                                        </p:tgtEl>
-                                        <p:attrNameLst>
-                                          <p:attrName>style.visibility</p:attrName>
-                                        </p:attrNameLst>
-                                      </p:cBhvr>
-                                      <p:to>
-                                        <p:strVal val="visible"/>
-                                      </p:to>
-                                    </p:set>
-                                  </p:childTnLst>
-                                </p:cTn>
-                              </p:par>
-                            </p:childTnLst>
-                          </p:cTn>
-                        </p:par>
-                      </p:childTnLst>
-                    </p:cTn>
-                  </p:par>
-                </p:childTnLst>
-              </p:cTn>
-              <p:prevCondLst>
-                <p:cond evt="onPrev" delay="0">
-                  <p:tgtEl>
-                    <p:sldTgt/>
-                  </p:tgtEl>
-                </p:cond>
-              </p:prevCondLst>
-              <p:nextCondLst>
-                <p:cond evt="onNext" delay="0">
-                  <p:tgtEl>
-                    <p:sldTgt/>
-                  </p:tgtEl>
-                </p:cond>
-              </p:nextCondLst>
-            </p:seq>
-          </p:childTnLst>
-        </p:cTn>
+        <p:cTn id="1" dur="indefinite" restart="never" nodeType="tmRoot"/>
       </p:par>
     </p:tnLst>
   </p:timing>
@@ -19805,7 +19693,7 @@
                         <m:fPr>
                           <m:ctrlPr>
                             <a:rPr lang="en-GB" sz="2800" b="1" i="1" smtClean="0">
-                              <a:latin typeface="Cambria Math" panose="02040503050406030204" pitchFamily="18" charset="0"/>
+                              <a:latin typeface="Cambria Math" charset="0"/>
                             </a:rPr>
                           </m:ctrlPr>
                         </m:fPr>
@@ -23997,7 +23885,7 @@
                       <m:sSubPr>
                         <m:ctrlPr>
                           <a:rPr lang="en-GB" b="0" i="1" smtClean="0">
-                            <a:latin typeface="Cambria Math" panose="02040503050406030204" pitchFamily="18" charset="0"/>
+                            <a:latin typeface="Cambria Math" charset="0"/>
                           </a:rPr>
                         </m:ctrlPr>
                       </m:sSubPr>
@@ -24044,7 +23932,7 @@
                       <m:sSubPr>
                         <m:ctrlPr>
                           <a:rPr lang="en-GB" b="0" i="1" smtClean="0">
-                            <a:latin typeface="Cambria Math" panose="02040503050406030204" pitchFamily="18" charset="0"/>
+                            <a:latin typeface="Cambria Math" charset="0"/>
                           </a:rPr>
                         </m:ctrlPr>
                       </m:sSubPr>
@@ -24113,7 +24001,7 @@
                         <m:fPr>
                           <m:ctrlPr>
                             <a:rPr lang="en-GB" sz="2800" b="0" i="1" smtClean="0">
-                              <a:latin typeface="Cambria Math" panose="02040503050406030204" pitchFamily="18" charset="0"/>
+                              <a:latin typeface="Cambria Math" charset="0"/>
                             </a:rPr>
                           </m:ctrlPr>
                         </m:fPr>
@@ -24122,7 +24010,7 @@
                             <m:sSubPr>
                               <m:ctrlPr>
                                 <a:rPr lang="en-GB" sz="2800" b="0" i="1" smtClean="0">
-                                  <a:latin typeface="Cambria Math" panose="02040503050406030204" pitchFamily="18" charset="0"/>
+                                  <a:latin typeface="Cambria Math" charset="0"/>
                                 </a:rPr>
                               </m:ctrlPr>
                             </m:sSubPr>
@@ -24149,7 +24037,7 @@
                             <m:sSubPr>
                               <m:ctrlPr>
                                 <a:rPr lang="en-GB" sz="2800" b="0" i="1" smtClean="0">
-                                  <a:latin typeface="Cambria Math" panose="02040503050406030204" pitchFamily="18" charset="0"/>
+                                  <a:latin typeface="Cambria Math" charset="0"/>
                                 </a:rPr>
                               </m:ctrlPr>
                             </m:sSubPr>
@@ -27633,8 +27521,8 @@
           </a:p>
         </p:txBody>
       </p:sp>
-      <mc:AlternateContent xmlns:mc="http://schemas.openxmlformats.org/markup-compatibility/2006">
-        <mc:Choice xmlns:a14="http://schemas.microsoft.com/office/drawing/2010/main" Requires="a14">
+      <mc:AlternateContent xmlns:mc="http://schemas.openxmlformats.org/markup-compatibility/2006" xmlns:a14="http://schemas.microsoft.com/office/drawing/2010/main">
+        <mc:Choice Requires="a14">
           <p:sp>
             <p:nvSpPr>
               <p:cNvPr id="5" name="Rectangle 4"/>
@@ -27656,6 +27544,7 @@
               </a:bodyPr>
               <a:lstStyle/>
               <a:p>
+                <a:pPr/>
                 <a14:m>
                   <m:oMathPara xmlns:m="http://schemas.openxmlformats.org/officeDocument/2006/math">
                     <m:oMathParaPr>
@@ -27678,7 +27567,7 @@
                         <m:fPr>
                           <m:ctrlPr>
                             <a:rPr lang="en-GB" i="1">
-                              <a:latin typeface="Cambria Math" panose="02040503050406030204" pitchFamily="18" charset="0"/>
+                              <a:latin typeface="Cambria Math" charset="0"/>
                             </a:rPr>
                           </m:ctrlPr>
                         </m:fPr>
@@ -27687,7 +27576,7 @@
                             <m:sSubPr>
                               <m:ctrlPr>
                                 <a:rPr lang="en-GB" i="1">
-                                  <a:latin typeface="Cambria Math" panose="02040503050406030204" pitchFamily="18" charset="0"/>
+                                  <a:latin typeface="Cambria Math" charset="0"/>
                                 </a:rPr>
                               </m:ctrlPr>
                             </m:sSubPr>
@@ -27714,7 +27603,7 @@
                             <m:sSubPr>
                               <m:ctrlPr>
                                 <a:rPr lang="en-GB" i="1">
-                                  <a:latin typeface="Cambria Math" panose="02040503050406030204" pitchFamily="18" charset="0"/>
+                                  <a:latin typeface="Cambria Math" charset="0"/>
                                 </a:rPr>
                               </m:ctrlPr>
                             </m:sSubPr>
@@ -27745,7 +27634,7 @@
             </p:txBody>
           </p:sp>
         </mc:Choice>
-        <mc:Fallback>
+        <mc:Fallback xmlns="">
           <p:sp>
             <p:nvSpPr>
               <p:cNvPr id="5" name="Rectangle 4"/>
@@ -30835,8 +30724,8 @@
           </a:p>
         </p:txBody>
       </p:sp>
-      <mc:AlternateContent xmlns:mc="http://schemas.openxmlformats.org/markup-compatibility/2006">
-        <mc:Choice xmlns:a14="http://schemas.microsoft.com/office/drawing/2010/main" Requires="a14">
+      <mc:AlternateContent xmlns:mc="http://schemas.openxmlformats.org/markup-compatibility/2006" xmlns:a14="http://schemas.microsoft.com/office/drawing/2010/main">
+        <mc:Choice Requires="a14">
           <p:sp>
             <p:nvSpPr>
               <p:cNvPr id="3" name="Content Placeholder 2"/>
@@ -30918,7 +30807,7 @@
                       <m:sSubPr>
                         <m:ctrlPr>
                           <a:rPr lang="en-GB" b="0" i="1" smtClean="0">
-                            <a:latin typeface="Cambria Math" panose="02040503050406030204" pitchFamily="18" charset="0"/>
+                            <a:latin typeface="Cambria Math" charset="0"/>
                           </a:rPr>
                         </m:ctrlPr>
                       </m:sSubPr>
@@ -30949,7 +30838,7 @@
                       <m:fPr>
                         <m:ctrlPr>
                           <a:rPr lang="en-GB" b="0" i="1" smtClean="0">
-                            <a:latin typeface="Cambria Math" panose="02040503050406030204" pitchFamily="18" charset="0"/>
+                            <a:latin typeface="Cambria Math" charset="0"/>
                           </a:rPr>
                         </m:ctrlPr>
                       </m:fPr>
@@ -30958,7 +30847,7 @@
                           <m:sSubPr>
                             <m:ctrlPr>
                               <a:rPr lang="en-GB" b="0" i="1" smtClean="0">
-                                <a:latin typeface="Cambria Math" panose="02040503050406030204" pitchFamily="18" charset="0"/>
+                                <a:latin typeface="Cambria Math" charset="0"/>
                               </a:rPr>
                             </m:ctrlPr>
                           </m:sSubPr>
@@ -31025,7 +30914,7 @@
                       <m:fPr>
                         <m:ctrlPr>
                           <a:rPr lang="en-GB" b="0" i="1" smtClean="0">
-                            <a:latin typeface="Cambria Math" panose="02040503050406030204" pitchFamily="18" charset="0"/>
+                            <a:latin typeface="Cambria Math" charset="0"/>
                           </a:rPr>
                         </m:ctrlPr>
                       </m:fPr>
@@ -31034,7 +30923,7 @@
                           <m:sSubPr>
                             <m:ctrlPr>
                               <a:rPr lang="en-GB" b="0" i="1" smtClean="0">
-                                <a:latin typeface="Cambria Math" panose="02040503050406030204" pitchFamily="18" charset="0"/>
+                                <a:latin typeface="Cambria Math" charset="0"/>
                               </a:rPr>
                             </m:ctrlPr>
                           </m:sSubPr>
@@ -31061,7 +30950,7 @@
                           <m:fPr>
                             <m:ctrlPr>
                               <a:rPr lang="en-GB" b="0" i="1" smtClean="0">
-                                <a:latin typeface="Cambria Math" panose="02040503050406030204" pitchFamily="18" charset="0"/>
+                                <a:latin typeface="Cambria Math" charset="0"/>
                               </a:rPr>
                             </m:ctrlPr>
                           </m:fPr>
@@ -31070,7 +30959,7 @@
                               <m:sSubPr>
                                 <m:ctrlPr>
                                   <a:rPr lang="en-GB" b="0" i="1" smtClean="0">
-                                    <a:latin typeface="Cambria Math" panose="02040503050406030204" pitchFamily="18" charset="0"/>
+                                    <a:latin typeface="Cambria Math" charset="0"/>
                                   </a:rPr>
                                 </m:ctrlPr>
                               </m:sSubPr>
@@ -31122,7 +31011,7 @@
             </p:txBody>
           </p:sp>
         </mc:Choice>
-        <mc:Fallback>
+        <mc:Fallback xmlns="">
           <p:sp>
             <p:nvSpPr>
               <p:cNvPr id="3" name="Content Placeholder 2"/>
@@ -33124,8 +33013,8 @@
           </a:p>
         </p:txBody>
       </p:sp>
-      <mc:AlternateContent xmlns:mc="http://schemas.openxmlformats.org/markup-compatibility/2006">
-        <mc:Choice xmlns:a14="http://schemas.microsoft.com/office/drawing/2010/main" Requires="a14">
+      <mc:AlternateContent xmlns:mc="http://schemas.openxmlformats.org/markup-compatibility/2006" xmlns:a14="http://schemas.microsoft.com/office/drawing/2010/main">
+        <mc:Choice Requires="a14">
           <p:sp>
             <p:nvSpPr>
               <p:cNvPr id="3" name="Content Placeholder 2"/>
@@ -33247,7 +33136,7 @@
             </p:txBody>
           </p:sp>
         </mc:Choice>
-        <mc:Fallback>
+        <mc:Fallback xmlns="">
           <p:sp>
             <p:nvSpPr>
               <p:cNvPr id="3" name="Content Placeholder 2"/>

</xml_diff>